<commit_message>
Atualização do projeto para a Sprint 1
</commit_message>
<xml_diff>
--- a/docs/apresentacao/apresentacao - TEMPLATE.pptx
+++ b/docs/apresentacao/apresentacao - TEMPLATE.pptx
@@ -5,7 +5,7 @@
     <p:sldMasterId id="2147483660" r:id="rId1"/>
   </p:sldMasterIdLst>
   <p:notesMasterIdLst>
-    <p:notesMasterId r:id="rId10"/>
+    <p:notesMasterId r:id="rId13"/>
   </p:notesMasterIdLst>
   <p:sldIdLst>
     <p:sldId id="256" r:id="rId2"/>
@@ -14,8 +14,11 @@
     <p:sldId id="282" r:id="rId5"/>
     <p:sldId id="283" r:id="rId6"/>
     <p:sldId id="285" r:id="rId7"/>
-    <p:sldId id="284" r:id="rId8"/>
-    <p:sldId id="286" r:id="rId9"/>
+    <p:sldId id="287" r:id="rId8"/>
+    <p:sldId id="288" r:id="rId9"/>
+    <p:sldId id="289" r:id="rId10"/>
+    <p:sldId id="284" r:id="rId11"/>
+    <p:sldId id="286" r:id="rId12"/>
   </p:sldIdLst>
   <p:sldSz cx="12192000" cy="6858000"/>
   <p:notesSz cx="6858000" cy="9144000"/>
@@ -114,7 +117,23 @@
       </a:defRPr>
     </a:lvl9pPr>
   </p:defaultTextStyle>
+  <p:extLst>
+    <p:ext uri="{EFAFB233-063F-42B5-8137-9DF3F51BA10A}">
+      <p15:sldGuideLst xmlns:p15="http://schemas.microsoft.com/office/powerpoint/2012/main"/>
+    </p:ext>
+  </p:extLst>
 </p:presentation>
+</file>
+
+<file path=ppt/revisionInfo.xml><?xml version="1.0" encoding="utf-8"?>
+<p1510:revInfo xmlns:a="http://schemas.openxmlformats.org/drawingml/2006/main" xmlns:r="http://schemas.openxmlformats.org/officeDocument/2006/relationships" xmlns:p1510="http://schemas.microsoft.com/office/powerpoint/2015/10/main">
+  <p1510:revLst>
+    <p1510:client id="{22C84594-CA9C-A209-26CD-BF224B6D06B0}" v="40" dt="2022-09-25T19:59:22.769"/>
+    <p1510:client id="{3782EBDD-AE0F-E02D-3B34-62A886C974C6}" v="653" dt="2022-09-25T19:05:04.041"/>
+    <p1510:client id="{71F4C946-52D8-D4DD-3954-F996CD0DC50B}" v="6" dt="2022-09-25T19:59:17.630"/>
+    <p1510:client id="{AE82A318-D89D-F423-DAAC-7801468CC672}" v="646" dt="2022-09-25T21:28:22.562"/>
+  </p1510:revLst>
+</p1510:revInfo>
 </file>
 
 <file path=ppt/notesMasters/notesMaster1.xml><?xml version="1.0" encoding="utf-8"?>
@@ -199,7 +218,7 @@
           <a:p>
             <a:fld id="{2BDE29EE-9B87-419F-AF79-1B2A070670AC}" type="datetimeFigureOut">
               <a:rPr lang="pt-BR" smtClean="0"/>
-              <a:t>05/04/2022</a:t>
+              <a:t>25/09/2022</a:t>
             </a:fld>
             <a:endParaRPr lang="pt-BR"/>
           </a:p>
@@ -9154,7 +9173,7 @@
               <a:rPr lang="pt-BR"/>
               <a:t>Clique para editar o título Mestre</a:t>
             </a:r>
-            <a:endParaRPr lang="en-US" dirty="0"/>
+            <a:endParaRPr lang="en-US"/>
           </a:p>
         </p:txBody>
       </p:sp>
@@ -9234,7 +9253,7 @@
               <a:rPr lang="pt-BR"/>
               <a:t>Clique para editar o estilo do subtítulo Mestre</a:t>
             </a:r>
-            <a:endParaRPr lang="en-US" dirty="0"/>
+            <a:endParaRPr lang="en-US"/>
           </a:p>
         </p:txBody>
       </p:sp>
@@ -9259,7 +9278,7 @@
           <a:p>
             <a:fld id="{DC3F9AA5-1F73-45E6-BD6D-7E2F5AFE1A15}" type="datetimeFigureOut">
               <a:rPr lang="pt-BR" smtClean="0"/>
-              <a:t>05/04/2022</a:t>
+              <a:t>25/09/2022</a:t>
             </a:fld>
             <a:endParaRPr lang="pt-BR"/>
           </a:p>
@@ -9393,7 +9412,7 @@
               <a:rPr lang="pt-BR"/>
               <a:t>Clique para editar o título Mestre</a:t>
             </a:r>
-            <a:endParaRPr lang="en-US" dirty="0"/>
+            <a:endParaRPr lang="en-US"/>
           </a:p>
         </p:txBody>
       </p:sp>
@@ -9445,7 +9464,7 @@
               <a:rPr lang="pt-BR"/>
               <a:t>Quinto nível</a:t>
             </a:r>
-            <a:endParaRPr lang="en-US" dirty="0"/>
+            <a:endParaRPr lang="en-US"/>
           </a:p>
         </p:txBody>
       </p:sp>
@@ -9466,7 +9485,7 @@
           <a:p>
             <a:fld id="{DC3F9AA5-1F73-45E6-BD6D-7E2F5AFE1A15}" type="datetimeFigureOut">
               <a:rPr lang="pt-BR" smtClean="0"/>
-              <a:t>05/04/2022</a:t>
+              <a:t>25/09/2022</a:t>
             </a:fld>
             <a:endParaRPr lang="pt-BR"/>
           </a:p>
@@ -9568,7 +9587,7 @@
               <a:rPr lang="pt-BR"/>
               <a:t>Clique para editar o título Mestre</a:t>
             </a:r>
-            <a:endParaRPr lang="en-US" dirty="0"/>
+            <a:endParaRPr lang="en-US"/>
           </a:p>
         </p:txBody>
       </p:sp>
@@ -9625,7 +9644,7 @@
               <a:rPr lang="pt-BR"/>
               <a:t>Quinto nível</a:t>
             </a:r>
-            <a:endParaRPr lang="en-US" dirty="0"/>
+            <a:endParaRPr lang="en-US"/>
           </a:p>
         </p:txBody>
       </p:sp>
@@ -9646,7 +9665,7 @@
           <a:p>
             <a:fld id="{DC3F9AA5-1F73-45E6-BD6D-7E2F5AFE1A15}" type="datetimeFigureOut">
               <a:rPr lang="pt-BR" smtClean="0"/>
-              <a:t>05/04/2022</a:t>
+              <a:t>25/09/2022</a:t>
             </a:fld>
             <a:endParaRPr lang="pt-BR"/>
           </a:p>
@@ -9778,7 +9797,7 @@
               <a:rPr lang="pt-BR"/>
               <a:t>Clique para editar o título Mestre</a:t>
             </a:r>
-            <a:endParaRPr lang="en-US" dirty="0"/>
+            <a:endParaRPr lang="en-US"/>
           </a:p>
         </p:txBody>
       </p:sp>
@@ -9830,7 +9849,7 @@
               <a:rPr lang="pt-BR"/>
               <a:t>Quinto nível</a:t>
             </a:r>
-            <a:endParaRPr lang="en-US" dirty="0"/>
+            <a:endParaRPr lang="en-US"/>
           </a:p>
         </p:txBody>
       </p:sp>
@@ -9851,7 +9870,7 @@
           <a:p>
             <a:fld id="{DC3F9AA5-1F73-45E6-BD6D-7E2F5AFE1A15}" type="datetimeFigureOut">
               <a:rPr lang="pt-BR" smtClean="0"/>
-              <a:t>05/04/2022</a:t>
+              <a:t>25/09/2022</a:t>
             </a:fld>
             <a:endParaRPr lang="pt-BR"/>
           </a:p>
@@ -18600,7 +18619,7 @@
               <a:rPr lang="pt-BR"/>
               <a:t>Clique para editar o título Mestre</a:t>
             </a:r>
-            <a:endParaRPr lang="en-US" dirty="0"/>
+            <a:endParaRPr lang="en-US"/>
           </a:p>
         </p:txBody>
       </p:sp>
@@ -18749,7 +18768,7 @@
           <a:p>
             <a:fld id="{DC3F9AA5-1F73-45E6-BD6D-7E2F5AFE1A15}" type="datetimeFigureOut">
               <a:rPr lang="pt-BR" smtClean="0"/>
-              <a:t>05/04/2022</a:t>
+              <a:t>25/09/2022</a:t>
             </a:fld>
             <a:endParaRPr lang="pt-BR"/>
           </a:p>
@@ -18888,7 +18907,7 @@
               <a:rPr lang="pt-BR"/>
               <a:t>Clique para editar o título Mestre</a:t>
             </a:r>
-            <a:endParaRPr lang="en-US" dirty="0"/>
+            <a:endParaRPr lang="en-US"/>
           </a:p>
         </p:txBody>
       </p:sp>
@@ -18945,7 +18964,7 @@
               <a:rPr lang="pt-BR"/>
               <a:t>Quinto nível</a:t>
             </a:r>
-            <a:endParaRPr lang="en-US" dirty="0"/>
+            <a:endParaRPr lang="en-US"/>
           </a:p>
         </p:txBody>
       </p:sp>
@@ -19002,7 +19021,7 @@
               <a:rPr lang="pt-BR"/>
               <a:t>Quinto nível</a:t>
             </a:r>
-            <a:endParaRPr lang="en-US" dirty="0"/>
+            <a:endParaRPr lang="en-US"/>
           </a:p>
         </p:txBody>
       </p:sp>
@@ -19023,7 +19042,7 @@
           <a:p>
             <a:fld id="{DC3F9AA5-1F73-45E6-BD6D-7E2F5AFE1A15}" type="datetimeFigureOut">
               <a:rPr lang="pt-BR" smtClean="0"/>
-              <a:t>05/04/2022</a:t>
+              <a:t>25/09/2022</a:t>
             </a:fld>
             <a:endParaRPr lang="pt-BR"/>
           </a:p>
@@ -19120,7 +19139,7 @@
               <a:rPr lang="pt-BR"/>
               <a:t>Clique para editar o título Mestre</a:t>
             </a:r>
-            <a:endParaRPr lang="en-US" dirty="0"/>
+            <a:endParaRPr lang="en-US"/>
           </a:p>
         </p:txBody>
       </p:sp>
@@ -19255,7 +19274,7 @@
               <a:rPr lang="pt-BR"/>
               <a:t>Quinto nível</a:t>
             </a:r>
-            <a:endParaRPr lang="en-US" dirty="0"/>
+            <a:endParaRPr lang="en-US"/>
           </a:p>
         </p:txBody>
       </p:sp>
@@ -19400,7 +19419,7 @@
               <a:rPr lang="pt-BR"/>
               <a:t>Quinto nível</a:t>
             </a:r>
-            <a:endParaRPr lang="en-US" dirty="0"/>
+            <a:endParaRPr lang="en-US"/>
           </a:p>
         </p:txBody>
       </p:sp>
@@ -19421,7 +19440,7 @@
           <a:p>
             <a:fld id="{DC3F9AA5-1F73-45E6-BD6D-7E2F5AFE1A15}" type="datetimeFigureOut">
               <a:rPr lang="pt-BR" smtClean="0"/>
-              <a:t>05/04/2022</a:t>
+              <a:t>25/09/2022</a:t>
             </a:fld>
             <a:endParaRPr lang="pt-BR"/>
           </a:p>
@@ -19518,7 +19537,7 @@
               <a:rPr lang="pt-BR"/>
               <a:t>Clique para editar o título Mestre</a:t>
             </a:r>
-            <a:endParaRPr lang="en-US" dirty="0"/>
+            <a:endParaRPr lang="en-US"/>
           </a:p>
         </p:txBody>
       </p:sp>
@@ -19539,7 +19558,7 @@
           <a:p>
             <a:fld id="{DC3F9AA5-1F73-45E6-BD6D-7E2F5AFE1A15}" type="datetimeFigureOut">
               <a:rPr lang="pt-BR" smtClean="0"/>
-              <a:t>05/04/2022</a:t>
+              <a:t>25/09/2022</a:t>
             </a:fld>
             <a:endParaRPr lang="pt-BR"/>
           </a:p>
@@ -19634,7 +19653,7 @@
           <a:p>
             <a:fld id="{DC3F9AA5-1F73-45E6-BD6D-7E2F5AFE1A15}" type="datetimeFigureOut">
               <a:rPr lang="pt-BR" smtClean="0"/>
-              <a:t>05/04/2022</a:t>
+              <a:t>25/09/2022</a:t>
             </a:fld>
             <a:endParaRPr lang="pt-BR"/>
           </a:p>
@@ -19745,7 +19764,7 @@
               <a:rPr lang="pt-BR"/>
               <a:t>Clique para editar o título Mestre</a:t>
             </a:r>
-            <a:endParaRPr lang="en-US" dirty="0"/>
+            <a:endParaRPr lang="en-US"/>
           </a:p>
         </p:txBody>
       </p:sp>
@@ -19830,7 +19849,7 @@
               <a:rPr lang="pt-BR"/>
               <a:t>Quinto nível</a:t>
             </a:r>
-            <a:endParaRPr lang="en-US" dirty="0"/>
+            <a:endParaRPr lang="en-US"/>
           </a:p>
         </p:txBody>
       </p:sp>
@@ -19924,7 +19943,7 @@
           <a:p>
             <a:fld id="{DC3F9AA5-1F73-45E6-BD6D-7E2F5AFE1A15}" type="datetimeFigureOut">
               <a:rPr lang="pt-BR" smtClean="0"/>
-              <a:t>05/04/2022</a:t>
+              <a:t>25/09/2022</a:t>
             </a:fld>
             <a:endParaRPr lang="pt-BR"/>
           </a:p>
@@ -20032,7 +20051,7 @@
               <a:rPr lang="pt-BR"/>
               <a:t>Clique para editar o título Mestre</a:t>
             </a:r>
-            <a:endParaRPr lang="en-US" dirty="0"/>
+            <a:endParaRPr lang="en-US"/>
           </a:p>
         </p:txBody>
       </p:sp>
@@ -20103,7 +20122,7 @@
               <a:rPr lang="pt-BR"/>
               <a:t>Clique no ícone para adicionar uma imagem</a:t>
             </a:r>
-            <a:endParaRPr lang="en-US" dirty="0"/>
+            <a:endParaRPr lang="en-US"/>
           </a:p>
         </p:txBody>
       </p:sp>
@@ -20204,7 +20223,7 @@
           <a:p>
             <a:fld id="{DC3F9AA5-1F73-45E6-BD6D-7E2F5AFE1A15}" type="datetimeFigureOut">
               <a:rPr lang="pt-BR" smtClean="0"/>
-              <a:t>05/04/2022</a:t>
+              <a:t>25/09/2022</a:t>
             </a:fld>
             <a:endParaRPr lang="pt-BR"/>
           </a:p>
@@ -20351,7 +20370,7 @@
               <a:rPr lang="pt-BR"/>
               <a:t>Clique para editar o título Mestre</a:t>
             </a:r>
-            <a:endParaRPr lang="en-US" dirty="0"/>
+            <a:endParaRPr lang="en-US"/>
           </a:p>
         </p:txBody>
       </p:sp>
@@ -20413,7 +20432,7 @@
               <a:rPr lang="pt-BR"/>
               <a:t>Quinto nível</a:t>
             </a:r>
-            <a:endParaRPr lang="en-US" dirty="0"/>
+            <a:endParaRPr lang="en-US"/>
           </a:p>
         </p:txBody>
       </p:sp>
@@ -20454,7 +20473,7 @@
           <a:p>
             <a:fld id="{DC3F9AA5-1F73-45E6-BD6D-7E2F5AFE1A15}" type="datetimeFigureOut">
               <a:rPr lang="pt-BR" smtClean="0"/>
-              <a:t>05/04/2022</a:t>
+              <a:t>25/09/2022</a:t>
             </a:fld>
             <a:endParaRPr lang="pt-BR"/>
           </a:p>
@@ -20972,14 +20991,21 @@
             <p:ph type="ctrTitle"/>
           </p:nvPr>
         </p:nvSpPr>
-        <p:spPr/>
+        <p:spPr>
+          <a:xfrm>
+            <a:off x="-606725" y="4830741"/>
+            <a:ext cx="7772400" cy="1463040"/>
+          </a:xfrm>
+        </p:spPr>
         <p:txBody>
-          <a:bodyPr/>
+          <a:bodyPr>
+            <a:normAutofit/>
+          </a:bodyPr>
           <a:lstStyle/>
           <a:p>
             <a:r>
-              <a:rPr lang="pt-BR" dirty="0"/>
-              <a:t>Projeto XPTO</a:t>
+              <a:rPr lang="pt-BR" sz="3600"/>
+              <a:t>Organização financeira</a:t>
             </a:r>
           </a:p>
         </p:txBody>
@@ -21002,15 +21028,23 @@
         </p:nvSpPr>
         <p:spPr/>
         <p:txBody>
-          <a:bodyPr/>
+          <a:bodyPr>
+            <a:normAutofit fontScale="25000" lnSpcReduction="20000"/>
+          </a:bodyPr>
           <a:lstStyle/>
           <a:p>
             <a:pPr lvl="0"/>
             <a:r>
-              <a:rPr lang="pt-BR" sz="2400" b="1" dirty="0"/>
+              <a:rPr lang="pt-BR" sz="7200" b="1"/>
               <a:t>Equipe</a:t>
             </a:r>
-            <a:endParaRPr lang="pt-BR" b="1" dirty="0"/>
+          </a:p>
+          <a:p>
+            <a:pPr marL="285750" lvl="0" indent="-285750">
+              <a:buFont typeface="Arial" panose="020B0604020202020204" pitchFamily="34" charset="0"/>
+              <a:buChar char="•"/>
+            </a:pPr>
+            <a:endParaRPr lang="pt-BR" sz="7200"/>
           </a:p>
           <a:p>
             <a:pPr marL="285750" lvl="0" indent="-285750">
@@ -21018,8 +21052,19 @@
               <a:buChar char="•"/>
             </a:pPr>
             <a:r>
-              <a:rPr lang="pt-BR" dirty="0"/>
-              <a:t>Fulano</a:t>
+              <a:rPr lang="pt-BR" sz="7200" err="1"/>
+              <a:t>Daivid</a:t>
+            </a:r>
+            <a:endParaRPr lang="pt-BR" sz="7200"/>
+          </a:p>
+          <a:p>
+            <a:pPr marL="285750" lvl="0" indent="-285750">
+              <a:buFont typeface="Arial" panose="020B0604020202020204" pitchFamily="34" charset="0"/>
+              <a:buChar char="•"/>
+            </a:pPr>
+            <a:r>
+              <a:rPr lang="pt-BR" sz="7200"/>
+              <a:t>Márcio</a:t>
             </a:r>
           </a:p>
           <a:p>
@@ -21028,8 +21073,8 @@
               <a:buChar char="•"/>
             </a:pPr>
             <a:r>
-              <a:rPr lang="pt-BR" dirty="0"/>
-              <a:t>Ciclano</a:t>
+              <a:rPr lang="pt-BR" sz="7200"/>
+              <a:t>Maria Vitoria</a:t>
             </a:r>
           </a:p>
           <a:p>
@@ -21038,12 +21083,29 @@
               <a:buChar char="•"/>
             </a:pPr>
             <a:r>
-              <a:rPr lang="pt-BR" dirty="0"/>
-              <a:t>Beltrano</a:t>
+              <a:rPr lang="pt-BR" sz="7200"/>
+              <a:t>Matheus</a:t>
             </a:r>
           </a:p>
           <a:p>
-            <a:endParaRPr lang="pt-BR" dirty="0"/>
+            <a:pPr marL="285750" lvl="0" indent="-285750">
+              <a:buFont typeface="Arial" panose="020B0604020202020204" pitchFamily="34" charset="0"/>
+              <a:buChar char="•"/>
+            </a:pPr>
+            <a:r>
+              <a:rPr lang="pt-BR" sz="7200"/>
+              <a:t>Rafael</a:t>
+            </a:r>
+          </a:p>
+          <a:p>
+            <a:pPr marL="285750" lvl="0" indent="-285750">
+              <a:buFont typeface="Arial" panose="020B0604020202020204" pitchFamily="34" charset="0"/>
+              <a:buChar char="•"/>
+            </a:pPr>
+            <a:endParaRPr lang="pt-BR"/>
+          </a:p>
+          <a:p>
+            <a:endParaRPr lang="pt-BR"/>
           </a:p>
         </p:txBody>
       </p:sp>
@@ -21051,6 +21113,538 @@
     <p:extLst>
       <p:ext uri="{BB962C8B-B14F-4D97-AF65-F5344CB8AC3E}">
         <p14:creationId xmlns:p14="http://schemas.microsoft.com/office/powerpoint/2010/main" val="1245466002"/>
+      </p:ext>
+    </p:extLst>
+  </p:cSld>
+  <p:clrMapOvr>
+    <a:masterClrMapping/>
+  </p:clrMapOvr>
+</p:sld>
+</file>
+
+<file path=ppt/slides/slide10.xml><?xml version="1.0" encoding="utf-8"?>
+<p:sld xmlns:a="http://schemas.openxmlformats.org/drawingml/2006/main" xmlns:r="http://schemas.openxmlformats.org/officeDocument/2006/relationships" xmlns:p="http://schemas.openxmlformats.org/presentationml/2006/main">
+  <p:cSld>
+    <p:spTree>
+      <p:nvGrpSpPr>
+        <p:cNvPr id="1" name=""/>
+        <p:cNvGrpSpPr/>
+        <p:nvPr/>
+      </p:nvGrpSpPr>
+      <p:grpSpPr>
+        <a:xfrm>
+          <a:off x="0" y="0"/>
+          <a:ext cx="0" cy="0"/>
+          <a:chOff x="0" y="0"/>
+          <a:chExt cx="0" cy="0"/>
+        </a:xfrm>
+      </p:grpSpPr>
+      <p:sp>
+        <p:nvSpPr>
+          <p:cNvPr id="2" name="Título 1">
+            <a:extLst>
+              <a:ext uri="{FF2B5EF4-FFF2-40B4-BE49-F238E27FC236}">
+                <a16:creationId xmlns:a16="http://schemas.microsoft.com/office/drawing/2014/main" id="{24A4530E-F8FB-46DF-B798-3DE41C9207D1}"/>
+              </a:ext>
+            </a:extLst>
+          </p:cNvPr>
+          <p:cNvSpPr>
+            <a:spLocks noGrp="1"/>
+          </p:cNvSpPr>
+          <p:nvPr>
+            <p:ph type="title"/>
+          </p:nvPr>
+        </p:nvSpPr>
+        <p:spPr/>
+        <p:txBody>
+          <a:bodyPr/>
+          <a:lstStyle/>
+          <a:p>
+            <a:r>
+              <a:rPr lang="pt-BR"/>
+              <a:t>Metodologia</a:t>
+            </a:r>
+          </a:p>
+        </p:txBody>
+      </p:sp>
+      <p:sp>
+        <p:nvSpPr>
+          <p:cNvPr id="3" name="Espaço Reservado para Conteúdo 2">
+            <a:extLst>
+              <a:ext uri="{FF2B5EF4-FFF2-40B4-BE49-F238E27FC236}">
+                <a16:creationId xmlns:a16="http://schemas.microsoft.com/office/drawing/2014/main" id="{64BA419B-8CAB-4B15-B0D8-E17B35CEB743}"/>
+              </a:ext>
+            </a:extLst>
+          </p:cNvPr>
+          <p:cNvSpPr>
+            <a:spLocks noGrp="1"/>
+          </p:cNvSpPr>
+          <p:nvPr>
+            <p:ph idx="1"/>
+          </p:nvPr>
+        </p:nvSpPr>
+        <p:spPr/>
+        <p:txBody>
+          <a:bodyPr vert="horz" lIns="45720" tIns="45720" rIns="45720" bIns="45720" rtlCol="0" anchor="t">
+            <a:normAutofit/>
+          </a:bodyPr>
+          <a:lstStyle/>
+          <a:p>
+            <a:pPr marL="0" indent="0" algn="just">
+              <a:buNone/>
+            </a:pPr>
+            <a:r>
+              <a:rPr lang="pt-BR">
+                <a:solidFill>
+                  <a:srgbClr val="24292F"/>
+                </a:solidFill>
+                <a:latin typeface="Arial"/>
+                <a:cs typeface="Arial"/>
+              </a:rPr>
+              <a:t>Para</a:t>
+            </a:r>
+            <a:r>
+              <a:rPr lang="pt-BR" b="0" i="0">
+                <a:solidFill>
+                  <a:srgbClr val="24292F"/>
+                </a:solidFill>
+                <a:effectLst/>
+                <a:latin typeface="Arial"/>
+                <a:cs typeface="Arial"/>
+              </a:rPr>
+              <a:t> nosso projeto,</a:t>
+            </a:r>
+            <a:r>
+              <a:rPr lang="pt-BR">
+                <a:solidFill>
+                  <a:srgbClr val="24292F"/>
+                </a:solidFill>
+                <a:latin typeface="Arial"/>
+                <a:cs typeface="Arial"/>
+              </a:rPr>
+              <a:t> utilizamos</a:t>
+            </a:r>
+            <a:r>
+              <a:rPr lang="pt-BR" b="0" i="0">
+                <a:solidFill>
+                  <a:srgbClr val="24292F"/>
+                </a:solidFill>
+                <a:effectLst/>
+                <a:latin typeface="Arial"/>
+                <a:cs typeface="Arial"/>
+              </a:rPr>
+              <a:t> uma metodologia analítica e democrática</a:t>
+            </a:r>
+            <a:r>
+              <a:rPr lang="pt-BR">
+                <a:solidFill>
+                  <a:srgbClr val="24292F"/>
+                </a:solidFill>
+                <a:latin typeface="Arial"/>
+                <a:cs typeface="Arial"/>
+              </a:rPr>
+              <a:t>, de modo que observássemos os problemas e soluções, ideias no geral, de todos ângulos.</a:t>
+            </a:r>
+            <a:endParaRPr lang="pt-BR">
+              <a:solidFill>
+                <a:srgbClr val="000000"/>
+              </a:solidFill>
+              <a:latin typeface="Arial"/>
+              <a:cs typeface="Arial"/>
+            </a:endParaRPr>
+          </a:p>
+          <a:p>
+            <a:pPr marL="0" indent="0" algn="just">
+              <a:buNone/>
+            </a:pPr>
+            <a:r>
+              <a:rPr lang="pt-BR">
+                <a:solidFill>
+                  <a:srgbClr val="24292F"/>
+                </a:solidFill>
+                <a:latin typeface="Arial"/>
+                <a:cs typeface="Arial"/>
+              </a:rPr>
+              <a:t>As reuniões</a:t>
+            </a:r>
+            <a:r>
+              <a:rPr lang="pt-BR" b="0" i="0">
+                <a:solidFill>
+                  <a:srgbClr val="24292F"/>
+                </a:solidFill>
+                <a:effectLst/>
+                <a:latin typeface="Arial"/>
+                <a:cs typeface="Arial"/>
+              </a:rPr>
+              <a:t> </a:t>
+            </a:r>
+            <a:r>
+              <a:rPr lang="pt-BR">
+                <a:solidFill>
+                  <a:srgbClr val="24292F"/>
+                </a:solidFill>
+                <a:latin typeface="Arial"/>
+                <a:cs typeface="Arial"/>
+              </a:rPr>
+              <a:t>foram essenciais, em quase</a:t>
+            </a:r>
+            <a:r>
+              <a:rPr lang="pt-BR" b="0" i="0">
+                <a:solidFill>
+                  <a:srgbClr val="24292F"/>
+                </a:solidFill>
+                <a:effectLst/>
+                <a:latin typeface="Arial"/>
+                <a:cs typeface="Arial"/>
+              </a:rPr>
+              <a:t> todos os dias</a:t>
+            </a:r>
+            <a:r>
+              <a:rPr lang="pt-BR">
+                <a:solidFill>
+                  <a:srgbClr val="24292F"/>
+                </a:solidFill>
+                <a:latin typeface="Arial"/>
+                <a:cs typeface="Arial"/>
+              </a:rPr>
+              <a:t>,</a:t>
+            </a:r>
+            <a:r>
+              <a:rPr lang="pt-BR" b="0" i="0">
+                <a:solidFill>
+                  <a:srgbClr val="24292F"/>
+                </a:solidFill>
+                <a:effectLst/>
+                <a:latin typeface="Arial"/>
+                <a:cs typeface="Arial"/>
+              </a:rPr>
+              <a:t> para que os integrantes </a:t>
+            </a:r>
+            <a:r>
+              <a:rPr lang="pt-BR">
+                <a:solidFill>
+                  <a:srgbClr val="24292F"/>
+                </a:solidFill>
+                <a:latin typeface="Arial"/>
+                <a:cs typeface="Arial"/>
+              </a:rPr>
+              <a:t>pudessem debater e expor</a:t>
+            </a:r>
+            <a:r>
+              <a:rPr lang="pt-BR" b="0" i="0">
+                <a:solidFill>
+                  <a:srgbClr val="24292F"/>
+                </a:solidFill>
+                <a:effectLst/>
+                <a:latin typeface="Arial"/>
+                <a:cs typeface="Arial"/>
+              </a:rPr>
+              <a:t> suas </a:t>
+            </a:r>
+            <a:r>
+              <a:rPr lang="pt-BR">
+                <a:solidFill>
+                  <a:srgbClr val="24292F"/>
+                </a:solidFill>
+                <a:latin typeface="Arial"/>
+                <a:cs typeface="Arial"/>
+              </a:rPr>
+              <a:t>opiniões, sugestões, alterações, </a:t>
+            </a:r>
+            <a:r>
+              <a:rPr lang="pt-BR" b="0" i="0">
+                <a:solidFill>
+                  <a:srgbClr val="24292F"/>
+                </a:solidFill>
+                <a:effectLst/>
+                <a:latin typeface="Arial"/>
+                <a:cs typeface="Arial"/>
+              </a:rPr>
+              <a:t>visões</a:t>
+            </a:r>
+            <a:r>
+              <a:rPr lang="pt-BR">
+                <a:solidFill>
+                  <a:srgbClr val="24292F"/>
+                </a:solidFill>
+                <a:latin typeface="Arial"/>
+                <a:cs typeface="Arial"/>
+              </a:rPr>
+              <a:t>, e assim decidíssemos os próximos passos, além de avaliar o progresso do nosso projeto</a:t>
+            </a:r>
+            <a:r>
+              <a:rPr lang="pt-BR" b="0" i="0">
+                <a:solidFill>
+                  <a:srgbClr val="24292F"/>
+                </a:solidFill>
+                <a:effectLst/>
+                <a:latin typeface="Arial"/>
+                <a:cs typeface="Arial"/>
+              </a:rPr>
+              <a:t>, e</a:t>
+            </a:r>
+            <a:r>
+              <a:rPr lang="pt-BR">
+                <a:solidFill>
+                  <a:srgbClr val="24292F"/>
+                </a:solidFill>
+                <a:latin typeface="Arial"/>
+                <a:cs typeface="Arial"/>
+              </a:rPr>
+              <a:t> providenciar as</a:t>
+            </a:r>
+            <a:r>
+              <a:rPr lang="pt-BR" b="0" i="0">
+                <a:solidFill>
+                  <a:srgbClr val="24292F"/>
+                </a:solidFill>
+                <a:effectLst/>
+                <a:latin typeface="Arial"/>
+                <a:cs typeface="Arial"/>
+              </a:rPr>
+              <a:t> possíveis implementações.</a:t>
+            </a:r>
+            <a:endParaRPr lang="pt-BR">
+              <a:solidFill>
+                <a:srgbClr val="000000"/>
+              </a:solidFill>
+              <a:latin typeface="Arial"/>
+              <a:cs typeface="Arial"/>
+            </a:endParaRPr>
+          </a:p>
+          <a:p>
+            <a:pPr marL="0" indent="0" algn="just">
+              <a:buNone/>
+            </a:pPr>
+            <a:r>
+              <a:rPr lang="pt-BR">
+                <a:solidFill>
+                  <a:srgbClr val="24292F"/>
+                </a:solidFill>
+                <a:latin typeface="Arial"/>
+                <a:cs typeface="Arial"/>
+              </a:rPr>
+              <a:t>Em seguida, </a:t>
+            </a:r>
+            <a:r>
+              <a:rPr lang="pt-BR" b="0" i="0">
+                <a:solidFill>
+                  <a:srgbClr val="24292F"/>
+                </a:solidFill>
+                <a:effectLst/>
+                <a:latin typeface="Arial"/>
+                <a:cs typeface="Arial"/>
+              </a:rPr>
+              <a:t>iniciamos o processo de criação e modificação do que foi exposto e combinado no grupo. Tendo em vista isso que foi relatado posteriormente, nosso grupo não possui funções pré-determinadas. Todos se reúnem para realizar o que foi decidido. </a:t>
+            </a:r>
+            <a:endParaRPr lang="pt-BR">
+              <a:latin typeface="Arial"/>
+              <a:cs typeface="Arial"/>
+            </a:endParaRPr>
+          </a:p>
+        </p:txBody>
+      </p:sp>
+    </p:spTree>
+    <p:extLst>
+      <p:ext uri="{BB962C8B-B14F-4D97-AF65-F5344CB8AC3E}">
+        <p14:creationId xmlns:p14="http://schemas.microsoft.com/office/powerpoint/2010/main" val="2874110374"/>
+      </p:ext>
+    </p:extLst>
+  </p:cSld>
+  <p:clrMapOvr>
+    <a:masterClrMapping/>
+  </p:clrMapOvr>
+</p:sld>
+</file>
+
+<file path=ppt/slides/slide11.xml><?xml version="1.0" encoding="utf-8"?>
+<p:sld xmlns:a="http://schemas.openxmlformats.org/drawingml/2006/main" xmlns:r="http://schemas.openxmlformats.org/officeDocument/2006/relationships" xmlns:p="http://schemas.openxmlformats.org/presentationml/2006/main">
+  <p:cSld>
+    <p:spTree>
+      <p:nvGrpSpPr>
+        <p:cNvPr id="1" name=""/>
+        <p:cNvGrpSpPr/>
+        <p:nvPr/>
+      </p:nvGrpSpPr>
+      <p:grpSpPr>
+        <a:xfrm>
+          <a:off x="0" y="0"/>
+          <a:ext cx="0" cy="0"/>
+          <a:chOff x="0" y="0"/>
+          <a:chExt cx="0" cy="0"/>
+        </a:xfrm>
+      </p:grpSpPr>
+      <p:sp>
+        <p:nvSpPr>
+          <p:cNvPr id="4" name="Título 3">
+            <a:extLst>
+              <a:ext uri="{FF2B5EF4-FFF2-40B4-BE49-F238E27FC236}">
+                <a16:creationId xmlns:a16="http://schemas.microsoft.com/office/drawing/2014/main" id="{8BF5C42F-EF95-444A-82E0-0B2480293636}"/>
+              </a:ext>
+            </a:extLst>
+          </p:cNvPr>
+          <p:cNvSpPr>
+            <a:spLocks noGrp="1"/>
+          </p:cNvSpPr>
+          <p:nvPr>
+            <p:ph type="title"/>
+          </p:nvPr>
+        </p:nvSpPr>
+        <p:spPr/>
+        <p:txBody>
+          <a:bodyPr>
+            <a:normAutofit/>
+          </a:bodyPr>
+          <a:lstStyle/>
+          <a:p>
+            <a:r>
+              <a:rPr lang="pt-BR" sz="3600"/>
+              <a:t>Falta de organização financeira</a:t>
+            </a:r>
+          </a:p>
+        </p:txBody>
+      </p:sp>
+      <p:sp>
+        <p:nvSpPr>
+          <p:cNvPr id="6" name="Espaço Reservado para Texto 5">
+            <a:extLst>
+              <a:ext uri="{FF2B5EF4-FFF2-40B4-BE49-F238E27FC236}">
+                <a16:creationId xmlns:a16="http://schemas.microsoft.com/office/drawing/2014/main" id="{FF277B38-6BF8-40CC-929C-430FF75E2516}"/>
+              </a:ext>
+            </a:extLst>
+          </p:cNvPr>
+          <p:cNvSpPr>
+            <a:spLocks noGrp="1"/>
+          </p:cNvSpPr>
+          <p:nvPr>
+            <p:ph type="body" sz="half" idx="2"/>
+          </p:nvPr>
+        </p:nvSpPr>
+        <p:spPr/>
+        <p:txBody>
+          <a:bodyPr>
+            <a:normAutofit fontScale="25000" lnSpcReduction="20000"/>
+          </a:bodyPr>
+          <a:lstStyle/>
+          <a:p>
+            <a:pPr lvl="0"/>
+            <a:r>
+              <a:rPr lang="pt-BR" sz="7200" b="1"/>
+              <a:t>Equipe</a:t>
+            </a:r>
+          </a:p>
+          <a:p>
+            <a:pPr marL="285750" lvl="0" indent="-285750">
+              <a:buFont typeface="Arial" panose="020B0604020202020204" pitchFamily="34" charset="0"/>
+              <a:buChar char="•"/>
+            </a:pPr>
+            <a:endParaRPr lang="pt-BR" sz="7200"/>
+          </a:p>
+          <a:p>
+            <a:pPr marL="285750" lvl="0" indent="-285750">
+              <a:buFont typeface="Arial" panose="020B0604020202020204" pitchFamily="34" charset="0"/>
+              <a:buChar char="•"/>
+            </a:pPr>
+            <a:r>
+              <a:rPr lang="pt-BR" sz="7200" err="1"/>
+              <a:t>Daivid</a:t>
+            </a:r>
+            <a:endParaRPr lang="pt-BR" sz="7200"/>
+          </a:p>
+          <a:p>
+            <a:pPr marL="285750" lvl="0" indent="-285750">
+              <a:buFont typeface="Arial" panose="020B0604020202020204" pitchFamily="34" charset="0"/>
+              <a:buChar char="•"/>
+            </a:pPr>
+            <a:r>
+              <a:rPr lang="pt-BR" sz="7200"/>
+              <a:t>Márcio</a:t>
+            </a:r>
+          </a:p>
+          <a:p>
+            <a:pPr marL="285750" lvl="0" indent="-285750">
+              <a:buFont typeface="Arial" panose="020B0604020202020204" pitchFamily="34" charset="0"/>
+              <a:buChar char="•"/>
+            </a:pPr>
+            <a:r>
+              <a:rPr lang="pt-BR" sz="7200"/>
+              <a:t>Maria Vitoria</a:t>
+            </a:r>
+          </a:p>
+          <a:p>
+            <a:pPr marL="285750" lvl="0" indent="-285750">
+              <a:buFont typeface="Arial" panose="020B0604020202020204" pitchFamily="34" charset="0"/>
+              <a:buChar char="•"/>
+            </a:pPr>
+            <a:r>
+              <a:rPr lang="pt-BR" sz="7200"/>
+              <a:t>Matheus</a:t>
+            </a:r>
+          </a:p>
+          <a:p>
+            <a:pPr marL="285750" lvl="0" indent="-285750">
+              <a:buFont typeface="Arial" panose="020B0604020202020204" pitchFamily="34" charset="0"/>
+              <a:buChar char="•"/>
+            </a:pPr>
+            <a:r>
+              <a:rPr lang="pt-BR" sz="7200"/>
+              <a:t>Rafael</a:t>
+            </a:r>
+          </a:p>
+          <a:p>
+            <a:endParaRPr lang="pt-BR"/>
+          </a:p>
+        </p:txBody>
+      </p:sp>
+      <p:pic>
+        <p:nvPicPr>
+          <p:cNvPr id="1026" name="Picture 2">
+            <a:extLst>
+              <a:ext uri="{FF2B5EF4-FFF2-40B4-BE49-F238E27FC236}">
+                <a16:creationId xmlns:a16="http://schemas.microsoft.com/office/drawing/2014/main" id="{7A6077C5-D874-4EB6-922B-F4E71AA55FFE}"/>
+              </a:ext>
+            </a:extLst>
+          </p:cNvPr>
+          <p:cNvPicPr>
+            <a:picLocks noGrp="1" noChangeAspect="1" noChangeArrowheads="1"/>
+          </p:cNvPicPr>
+          <p:nvPr>
+            <p:ph type="pic" idx="1"/>
+          </p:nvPr>
+        </p:nvPicPr>
+        <p:blipFill>
+          <a:blip r:embed="rId2">
+            <a:extLst>
+              <a:ext uri="{28A0092B-C50C-407E-A947-70E740481C1C}">
+                <a14:useLocalDpi xmlns:a14="http://schemas.microsoft.com/office/drawing/2010/main" val="0"/>
+              </a:ext>
+            </a:extLst>
+          </a:blip>
+          <a:srcRect t="14276" b="14276"/>
+          <a:stretch>
+            <a:fillRect/>
+          </a:stretch>
+        </p:blipFill>
+        <p:spPr bwMode="auto">
+          <a:prstGeom prst="rect">
+            <a:avLst/>
+          </a:prstGeom>
+          <a:noFill/>
+          <a:extLst>
+            <a:ext uri="{909E8E84-426E-40DD-AFC4-6F175D3DCCD1}">
+              <a14:hiddenFill xmlns:a14="http://schemas.microsoft.com/office/drawing/2010/main">
+                <a:solidFill>
+                  <a:srgbClr val="FFFFFF"/>
+                </a:solidFill>
+              </a14:hiddenFill>
+            </a:ext>
+          </a:extLst>
+        </p:spPr>
+      </p:pic>
+    </p:spTree>
+    <p:extLst>
+      <p:ext uri="{BB962C8B-B14F-4D97-AF65-F5344CB8AC3E}">
+        <p14:creationId xmlns:p14="http://schemas.microsoft.com/office/powerpoint/2010/main" val="3379578871"/>
       </p:ext>
     </p:extLst>
   </p:cSld>
@@ -21099,7 +21693,7 @@
           <a:lstStyle/>
           <a:p>
             <a:r>
-              <a:rPr lang="pt-BR" dirty="0"/>
+              <a:rPr lang="pt-BR"/>
               <a:t>Contexto DO Problema</a:t>
             </a:r>
           </a:p>
@@ -21121,15 +21715,67 @@
             <p:ph idx="1"/>
           </p:nvPr>
         </p:nvSpPr>
-        <p:spPr/>
+        <p:spPr>
+          <a:xfrm>
+            <a:off x="525518" y="2329793"/>
+            <a:ext cx="6349999" cy="4023360"/>
+          </a:xfrm>
+        </p:spPr>
         <p:txBody>
           <a:bodyPr/>
           <a:lstStyle/>
           <a:p>
-            <a:endParaRPr lang="pt-BR"/>
+            <a:pPr marL="0" indent="0" algn="just">
+              <a:buNone/>
+            </a:pPr>
+            <a:r>
+              <a:rPr lang="pt-BR" b="0" i="0">
+                <a:solidFill>
+                  <a:srgbClr val="24292F"/>
+                </a:solidFill>
+                <a:effectLst/>
+                <a:latin typeface="Arial" panose="020B0604020202020204" pitchFamily="34" charset="0"/>
+                <a:cs typeface="Arial" panose="020B0604020202020204" pitchFamily="34" charset="0"/>
+              </a:rPr>
+              <a:t>O problema cujo o qual nos deparamos se refere a falta de organização financeira e entendimento sobre finanças, que vai do gasto compulsivo, até a falta de entendimento sobre investimentos.</a:t>
+            </a:r>
+            <a:endParaRPr lang="pt-BR">
+              <a:latin typeface="Arial" panose="020B0604020202020204" pitchFamily="34" charset="0"/>
+              <a:cs typeface="Arial" panose="020B0604020202020204" pitchFamily="34" charset="0"/>
+            </a:endParaRPr>
           </a:p>
         </p:txBody>
       </p:sp>
+      <p:pic>
+        <p:nvPicPr>
+          <p:cNvPr id="5" name="Imagem 5" descr="Uma imagem contendo Site&#10;&#10;Descrição gerada automaticamente">
+            <a:extLst>
+              <a:ext uri="{FF2B5EF4-FFF2-40B4-BE49-F238E27FC236}">
+                <a16:creationId xmlns:a16="http://schemas.microsoft.com/office/drawing/2014/main" id="{9FDE1BF9-0EE7-C311-8EAD-F8C83BECFA48}"/>
+              </a:ext>
+            </a:extLst>
+          </p:cNvPr>
+          <p:cNvPicPr>
+            <a:picLocks noChangeAspect="1"/>
+          </p:cNvPicPr>
+          <p:nvPr/>
+        </p:nvPicPr>
+        <p:blipFill>
+          <a:blip r:embed="rId2"/>
+          <a:stretch>
+            <a:fillRect/>
+          </a:stretch>
+        </p:blipFill>
+        <p:spPr>
+          <a:xfrm>
+            <a:off x="7193666" y="2880416"/>
+            <a:ext cx="4720541" cy="3344584"/>
+          </a:xfrm>
+          <a:prstGeom prst="rect">
+            <a:avLst/>
+          </a:prstGeom>
+        </p:spPr>
+      </p:pic>
     </p:spTree>
     <p:extLst>
       <p:ext uri="{BB962C8B-B14F-4D97-AF65-F5344CB8AC3E}">
@@ -21182,7 +21828,7 @@
           <a:lstStyle/>
           <a:p>
             <a:r>
-              <a:rPr lang="pt-BR" dirty="0"/>
+              <a:rPr lang="pt-BR"/>
               <a:t>Público-Alvo | PERSONAS</a:t>
             </a:r>
           </a:p>
@@ -21204,15 +21850,73 @@
             <p:ph idx="1"/>
           </p:nvPr>
         </p:nvSpPr>
-        <p:spPr/>
+        <p:spPr>
+          <a:xfrm>
+            <a:off x="1024128" y="2592552"/>
+            <a:ext cx="7489251" cy="3716808"/>
+          </a:xfrm>
+        </p:spPr>
         <p:txBody>
-          <a:bodyPr/>
+          <a:bodyPr>
+            <a:normAutofit/>
+          </a:bodyPr>
           <a:lstStyle/>
           <a:p>
-            <a:endParaRPr lang="pt-BR"/>
+            <a:pPr algn="just"/>
+            <a:r>
+              <a:rPr lang="pt-BR" b="0" i="0">
+                <a:solidFill>
+                  <a:srgbClr val="24292F"/>
+                </a:solidFill>
+                <a:effectLst/>
+                <a:latin typeface="Arial" panose="020B0604020202020204" pitchFamily="34" charset="0"/>
+                <a:cs typeface="Arial" panose="020B0604020202020204" pitchFamily="34" charset="0"/>
+              </a:rPr>
+              <a:t>Nos dias de hoje em nosso país, é perceptível que as pessoas possuem interesse pelo tema finanças, não é atoa que é um dos temas que mais cresce nas mídias sociais. Tendo isso em vista o nosso projeto tem o objetivo de levar informações para esses indivíduos, sejam eles jovens, iniciando sua vida no mercado, ou pessoas que só querem informações ou instruções na área de finanças. </a:t>
+            </a:r>
+            <a:endParaRPr lang="pt-BR">
+              <a:latin typeface="Arial" panose="020B0604020202020204" pitchFamily="34" charset="0"/>
+              <a:cs typeface="Arial" panose="020B0604020202020204" pitchFamily="34" charset="0"/>
+            </a:endParaRPr>
           </a:p>
         </p:txBody>
       </p:sp>
+      <p:pic>
+        <p:nvPicPr>
+          <p:cNvPr id="4" name="Imagem 4">
+            <a:extLst>
+              <a:ext uri="{FF2B5EF4-FFF2-40B4-BE49-F238E27FC236}">
+                <a16:creationId xmlns:a16="http://schemas.microsoft.com/office/drawing/2014/main" id="{163DD8C4-DDB0-4BEC-A2CA-0B52FFC28585}"/>
+              </a:ext>
+            </a:extLst>
+          </p:cNvPr>
+          <p:cNvPicPr>
+            <a:picLocks noChangeAspect="1"/>
+          </p:cNvPicPr>
+          <p:nvPr/>
+        </p:nvPicPr>
+        <p:blipFill>
+          <a:blip r:embed="rId2">
+            <a:extLst>
+              <a:ext uri="{28A0092B-C50C-407E-A947-70E740481C1C}">
+                <a14:useLocalDpi xmlns:a14="http://schemas.microsoft.com/office/drawing/2010/main" val="0"/>
+              </a:ext>
+            </a:extLst>
+          </a:blip>
+          <a:stretch>
+            <a:fillRect/>
+          </a:stretch>
+        </p:blipFill>
+        <p:spPr>
+          <a:xfrm>
+            <a:off x="8574690" y="3112815"/>
+            <a:ext cx="3485931" cy="3485931"/>
+          </a:xfrm>
+          <a:prstGeom prst="rect">
+            <a:avLst/>
+          </a:prstGeom>
+        </p:spPr>
+      </p:pic>
     </p:spTree>
     <p:extLst>
       <p:ext uri="{BB962C8B-B14F-4D97-AF65-F5344CB8AC3E}">
@@ -21265,7 +21969,7 @@
           <a:lstStyle/>
           <a:p>
             <a:r>
-              <a:rPr lang="pt-BR" dirty="0"/>
+              <a:rPr lang="pt-BR"/>
               <a:t>Proposta de Solução | Objetivos</a:t>
             </a:r>
           </a:p>
@@ -21287,15 +21991,73 @@
             <p:ph idx="1"/>
           </p:nvPr>
         </p:nvSpPr>
-        <p:spPr/>
+        <p:spPr>
+          <a:xfrm>
+            <a:off x="1024129" y="2286000"/>
+            <a:ext cx="6044078" cy="4023360"/>
+          </a:xfrm>
+        </p:spPr>
         <p:txBody>
-          <a:bodyPr/>
+          <a:bodyPr>
+            <a:normAutofit/>
+          </a:bodyPr>
           <a:lstStyle/>
           <a:p>
-            <a:endParaRPr lang="pt-BR"/>
+            <a:pPr algn="just"/>
+            <a:r>
+              <a:rPr lang="pt-BR" b="0" i="0">
+                <a:solidFill>
+                  <a:srgbClr val="24292F"/>
+                </a:solidFill>
+                <a:effectLst/>
+                <a:latin typeface="Arial" panose="020B0604020202020204" pitchFamily="34" charset="0"/>
+                <a:cs typeface="Arial" panose="020B0604020202020204" pitchFamily="34" charset="0"/>
+              </a:rPr>
+              <a:t>Esse projeto tem o objetivo de auxiliar pessoas a se organizarem financeiramente, estipulação de renda, entendimento sobre ativos, iniciação a ativos e auxilio no entendimento de finanças, com textos e vídeos de terceiros para melhor compreensão. </a:t>
+            </a:r>
+            <a:endParaRPr lang="pt-BR">
+              <a:latin typeface="Arial" panose="020B0604020202020204" pitchFamily="34" charset="0"/>
+              <a:cs typeface="Arial" panose="020B0604020202020204" pitchFamily="34" charset="0"/>
+            </a:endParaRPr>
           </a:p>
         </p:txBody>
       </p:sp>
+      <p:pic>
+        <p:nvPicPr>
+          <p:cNvPr id="4" name="Imagem 4">
+            <a:extLst>
+              <a:ext uri="{FF2B5EF4-FFF2-40B4-BE49-F238E27FC236}">
+                <a16:creationId xmlns:a16="http://schemas.microsoft.com/office/drawing/2014/main" id="{5AFD307E-3AFA-47E3-8D12-0E660420CB12}"/>
+              </a:ext>
+            </a:extLst>
+          </p:cNvPr>
+          <p:cNvPicPr>
+            <a:picLocks noChangeAspect="1"/>
+          </p:cNvPicPr>
+          <p:nvPr/>
+        </p:nvPicPr>
+        <p:blipFill>
+          <a:blip r:embed="rId2">
+            <a:extLst>
+              <a:ext uri="{28A0092B-C50C-407E-A947-70E740481C1C}">
+                <a14:useLocalDpi xmlns:a14="http://schemas.microsoft.com/office/drawing/2010/main" val="0"/>
+              </a:ext>
+            </a:extLst>
+          </a:blip>
+          <a:stretch>
+            <a:fillRect/>
+          </a:stretch>
+        </p:blipFill>
+        <p:spPr>
+          <a:xfrm>
+            <a:off x="7516925" y="2855026"/>
+            <a:ext cx="4199481" cy="2885308"/>
+          </a:xfrm>
+          <a:prstGeom prst="rect">
+            <a:avLst/>
+          </a:prstGeom>
+        </p:spPr>
+      </p:pic>
     </p:spTree>
     <p:extLst>
       <p:ext uri="{BB962C8B-B14F-4D97-AF65-F5344CB8AC3E}">
@@ -21348,7 +22110,7 @@
           <a:lstStyle/>
           <a:p>
             <a:r>
-              <a:rPr lang="pt-BR" dirty="0"/>
+              <a:rPr lang="pt-BR"/>
               <a:t>Histórias de Usuários e Requisitos</a:t>
             </a:r>
           </a:p>
@@ -21372,8 +22134,8 @@
         </p:nvSpPr>
         <p:spPr/>
         <p:txBody>
-          <a:bodyPr>
-            <a:normAutofit/>
+          <a:bodyPr vert="horz" lIns="45720" tIns="45720" rIns="45720" bIns="45720" rtlCol="0" anchor="t">
+            <a:normAutofit fontScale="92500" lnSpcReduction="20000"/>
           </a:bodyPr>
           <a:lstStyle/>
           <a:p>
@@ -21381,7 +22143,7 @@
               <a:buNone/>
             </a:pPr>
             <a:r>
-              <a:rPr lang="pt-BR" dirty="0"/>
+              <a:rPr lang="pt-BR"/>
               <a:t>Histórias de Usuários</a:t>
             </a:r>
           </a:p>
@@ -21391,20 +22153,19 @@
               <a:buChar char="§"/>
             </a:pPr>
             <a:r>
-              <a:rPr lang="pt-BR" dirty="0" err="1"/>
-              <a:t>agdasdads</a:t>
+              <a:rPr lang="pt-BR"/>
+              <a:t>Não temos, pois ainda não há usuários, apenas um público alvo já pré-definido.</a:t>
             </a:r>
-            <a:endParaRPr lang="pt-BR" dirty="0"/>
           </a:p>
           <a:p>
-            <a:endParaRPr lang="pt-BR" dirty="0"/>
+            <a:endParaRPr lang="pt-BR"/>
           </a:p>
           <a:p>
             <a:pPr marL="0" indent="0">
               <a:buNone/>
             </a:pPr>
             <a:r>
-              <a:rPr lang="pt-BR" dirty="0"/>
+              <a:rPr lang="pt-BR"/>
               <a:t>Requisitos Funcionais</a:t>
             </a:r>
           </a:p>
@@ -21414,23 +22175,22 @@
               <a:buChar char="§"/>
             </a:pPr>
             <a:r>
-              <a:rPr lang="pt-BR" dirty="0" err="1"/>
-              <a:t>agdasdads</a:t>
+              <a:rPr lang="pt-BR"/>
+              <a:t>Algo fácil e interativo.</a:t>
             </a:r>
-            <a:endParaRPr lang="pt-BR" dirty="0"/>
           </a:p>
           <a:p>
             <a:pPr marL="0" indent="0">
               <a:buNone/>
             </a:pPr>
-            <a:endParaRPr lang="pt-BR" dirty="0"/>
+            <a:endParaRPr lang="pt-BR"/>
           </a:p>
           <a:p>
             <a:pPr marL="0" indent="0">
               <a:buNone/>
             </a:pPr>
             <a:r>
-              <a:rPr lang="pt-BR" dirty="0"/>
+              <a:rPr lang="pt-BR"/>
               <a:t>Requisitos Não Funcionais</a:t>
             </a:r>
           </a:p>
@@ -21440,10 +22200,54 @@
               <a:buChar char="§"/>
             </a:pPr>
             <a:r>
-              <a:rPr lang="pt-BR" dirty="0" err="1"/>
-              <a:t>agdasdads</a:t>
+              <a:rPr lang="pt-BR">
+                <a:ea typeface="+mn-lt"/>
+                <a:cs typeface="+mn-lt"/>
+              </a:rPr>
+              <a:t> Iremos utilizar </a:t>
             </a:r>
-            <a:endParaRPr lang="pt-BR" dirty="0"/>
+            <a:r>
+              <a:rPr lang="pt-BR" err="1">
+                <a:ea typeface="+mn-lt"/>
+                <a:cs typeface="+mn-lt"/>
+              </a:rPr>
+              <a:t>html</a:t>
+            </a:r>
+            <a:r>
+              <a:rPr lang="pt-BR">
+                <a:ea typeface="+mn-lt"/>
+                <a:cs typeface="+mn-lt"/>
+              </a:rPr>
+              <a:t> e </a:t>
+            </a:r>
+            <a:r>
+              <a:rPr lang="pt-BR" err="1">
+                <a:ea typeface="+mn-lt"/>
+                <a:cs typeface="+mn-lt"/>
+              </a:rPr>
+              <a:t>css</a:t>
+            </a:r>
+            <a:r>
+              <a:rPr lang="pt-BR">
+                <a:ea typeface="+mn-lt"/>
+                <a:cs typeface="+mn-lt"/>
+              </a:rPr>
+              <a:t> para a codificação do site, pelo fato de ter um baixo custo de aplicação, e vídeos de pessoas, com autoridades no assunto, que estejam disponíveis ao público no YouTube. Nesse caso colocaríamos o player do YouTube rodando no site. Há a possibilidade de colocar o Google </a:t>
+            </a:r>
+            <a:r>
+              <a:rPr lang="pt-BR" err="1">
+                <a:ea typeface="+mn-lt"/>
+                <a:cs typeface="+mn-lt"/>
+              </a:rPr>
+              <a:t>adsense</a:t>
+            </a:r>
+            <a:r>
+              <a:rPr lang="pt-BR">
+                <a:ea typeface="+mn-lt"/>
+                <a:cs typeface="+mn-lt"/>
+              </a:rPr>
+              <a:t> em nosso site o para monetizar o mesmo e com essa receita, fazer upgrades no site.</a:t>
+            </a:r>
           </a:p>
         </p:txBody>
       </p:sp>
@@ -21499,7 +22303,7 @@
           <a:lstStyle/>
           <a:p>
             <a:r>
-              <a:rPr lang="pt-BR" dirty="0"/>
+              <a:rPr lang="pt-BR"/>
               <a:t>Projeto da Interface</a:t>
             </a:r>
           </a:p>
@@ -21521,15 +22325,79 @@
             <p:ph idx="1"/>
           </p:nvPr>
         </p:nvSpPr>
-        <p:spPr/>
+        <p:spPr>
+          <a:xfrm>
+            <a:off x="1024129" y="2321034"/>
+            <a:ext cx="4860035" cy="3389587"/>
+          </a:xfrm>
+        </p:spPr>
         <p:txBody>
           <a:bodyPr/>
           <a:lstStyle/>
+          <a:p>
+            <a:pPr algn="just"/>
+            <a:r>
+              <a:rPr lang="pt-BR" b="0" i="0">
+                <a:solidFill>
+                  <a:srgbClr val="24292F"/>
+                </a:solidFill>
+                <a:effectLst/>
+                <a:latin typeface="Arial" panose="020B0604020202020204" pitchFamily="34" charset="0"/>
+                <a:cs typeface="Arial" panose="020B0604020202020204" pitchFamily="34" charset="0"/>
+              </a:rPr>
+              <a:t>Pensamos em fazer a interface do projeto de forma interativa e com uso simples, para que o usuário tenha interesse em usá-lo. O mesmo terá um layout responsivo, ou seja, o site se adequará de forma inteligente, de acordo com o tamanho da tela de seu dispositivo. </a:t>
+            </a:r>
+          </a:p>
+          <a:p>
+            <a:endParaRPr lang="pt-BR" sz="1800" b="0" i="0">
+              <a:solidFill>
+                <a:srgbClr val="24292F"/>
+              </a:solidFill>
+              <a:effectLst/>
+              <a:latin typeface="Calibri" panose="020F0502020204030204" pitchFamily="34" charset="0"/>
+            </a:endParaRPr>
+          </a:p>
           <a:p>
             <a:endParaRPr lang="pt-BR"/>
           </a:p>
         </p:txBody>
       </p:sp>
+      <p:pic>
+        <p:nvPicPr>
+          <p:cNvPr id="5" name="Imagem 5">
+            <a:extLst>
+              <a:ext uri="{FF2B5EF4-FFF2-40B4-BE49-F238E27FC236}">
+                <a16:creationId xmlns:a16="http://schemas.microsoft.com/office/drawing/2014/main" id="{9E84EC22-4D7B-4B86-9C9C-53D4F09F7A4A}"/>
+              </a:ext>
+            </a:extLst>
+          </p:cNvPr>
+          <p:cNvPicPr>
+            <a:picLocks noChangeAspect="1"/>
+          </p:cNvPicPr>
+          <p:nvPr/>
+        </p:nvPicPr>
+        <p:blipFill>
+          <a:blip r:embed="rId2">
+            <a:extLst>
+              <a:ext uri="{28A0092B-C50C-407E-A947-70E740481C1C}">
+                <a14:useLocalDpi xmlns:a14="http://schemas.microsoft.com/office/drawing/2010/main" val="0"/>
+              </a:ext>
+            </a:extLst>
+          </a:blip>
+          <a:stretch>
+            <a:fillRect/>
+          </a:stretch>
+        </p:blipFill>
+        <p:spPr>
+          <a:xfrm>
+            <a:off x="7234913" y="2627586"/>
+            <a:ext cx="4350114" cy="3915103"/>
+          </a:xfrm>
+          <a:prstGeom prst="rect">
+            <a:avLst/>
+          </a:prstGeom>
+        </p:spPr>
+      </p:pic>
     </p:spTree>
     <p:extLst>
       <p:ext uri="{BB962C8B-B14F-4D97-AF65-F5344CB8AC3E}">
@@ -21546,6 +22414,14 @@
 <file path=ppt/slides/slide7.xml><?xml version="1.0" encoding="utf-8"?>
 <p:sld xmlns:a="http://schemas.openxmlformats.org/drawingml/2006/main" xmlns:r="http://schemas.openxmlformats.org/officeDocument/2006/relationships" xmlns:p="http://schemas.openxmlformats.org/presentationml/2006/main">
   <p:cSld>
+    <p:bg>
+      <p:bgPr>
+        <a:solidFill>
+          <a:schemeClr val="bg1"/>
+        </a:solidFill>
+        <a:effectLst/>
+      </p:bgPr>
+    </p:bg>
     <p:spTree>
       <p:nvGrpSpPr>
         <p:cNvPr id="1" name=""/>
@@ -21565,7 +22441,7 @@
           <p:cNvPr id="2" name="Título 1">
             <a:extLst>
               <a:ext uri="{FF2B5EF4-FFF2-40B4-BE49-F238E27FC236}">
-                <a16:creationId xmlns:a16="http://schemas.microsoft.com/office/drawing/2014/main" id="{24A4530E-F8FB-46DF-B798-3DE41C9207D1}"/>
+                <a16:creationId xmlns:a16="http://schemas.microsoft.com/office/drawing/2014/main" id="{25CB8B2F-7971-69C2-8A71-72F47E6ACFDA}"/>
               </a:ext>
             </a:extLst>
           </p:cNvPr>
@@ -21576,24 +22452,119 @@
             <p:ph type="title"/>
           </p:nvPr>
         </p:nvSpPr>
-        <p:spPr/>
+        <p:spPr>
+          <a:xfrm>
+            <a:off x="1024128" y="585216"/>
+            <a:ext cx="9720072" cy="1499616"/>
+          </a:xfrm>
+        </p:spPr>
         <p:txBody>
-          <a:bodyPr/>
+          <a:bodyPr>
+            <a:normAutofit/>
+          </a:bodyPr>
           <a:lstStyle/>
           <a:p>
             <a:r>
-              <a:rPr lang="pt-BR" dirty="0"/>
-              <a:t>Metodologia</a:t>
+              <a:rPr lang="pt-BR"/>
+              <a:t>investimentos</a:t>
             </a:r>
           </a:p>
         </p:txBody>
       </p:sp>
+      <p:pic>
+        <p:nvPicPr>
+          <p:cNvPr id="5" name="Imagem 5" descr="Interface gráfica do usuário, Aplicativo, Word&#10;&#10;Descrição gerada automaticamente">
+            <a:extLst>
+              <a:ext uri="{FF2B5EF4-FFF2-40B4-BE49-F238E27FC236}">
+                <a16:creationId xmlns:a16="http://schemas.microsoft.com/office/drawing/2014/main" id="{F2391007-2C40-B523-5DA4-97C719C10731}"/>
+              </a:ext>
+            </a:extLst>
+          </p:cNvPr>
+          <p:cNvPicPr>
+            <a:picLocks noChangeAspect="1"/>
+          </p:cNvPicPr>
+          <p:nvPr/>
+        </p:nvPicPr>
+        <p:blipFill rotWithShape="1">
+          <a:blip r:embed="rId2"/>
+          <a:srcRect l="5225" r="25281" b="-4"/>
+          <a:stretch/>
+        </p:blipFill>
+        <p:spPr>
+          <a:xfrm>
+            <a:off x="1201271" y="2597827"/>
+            <a:ext cx="2392403" cy="3399706"/>
+          </a:xfrm>
+          <a:prstGeom prst="rect">
+            <a:avLst/>
+          </a:prstGeom>
+        </p:spPr>
+      </p:pic>
+      <p:pic>
+        <p:nvPicPr>
+          <p:cNvPr id="4" name="Imagem 4" descr="Interface gráfica do usuário, Aplicativo&#10;&#10;Descrição gerada automaticamente">
+            <a:extLst>
+              <a:ext uri="{FF2B5EF4-FFF2-40B4-BE49-F238E27FC236}">
+                <a16:creationId xmlns:a16="http://schemas.microsoft.com/office/drawing/2014/main" id="{F4CED221-43C3-FB63-DCFB-682A084F2C9A}"/>
+              </a:ext>
+            </a:extLst>
+          </p:cNvPr>
+          <p:cNvPicPr>
+            <a:picLocks noChangeAspect="1"/>
+          </p:cNvPicPr>
+          <p:nvPr/>
+        </p:nvPicPr>
+        <p:blipFill rotWithShape="1">
+          <a:blip r:embed="rId3"/>
+          <a:srcRect r="4" b="2028"/>
+          <a:stretch/>
+        </p:blipFill>
+        <p:spPr>
+          <a:xfrm>
+            <a:off x="3775060" y="2286000"/>
+            <a:ext cx="2117733" cy="2048933"/>
+          </a:xfrm>
+          <a:prstGeom prst="rect">
+            <a:avLst/>
+          </a:prstGeom>
+        </p:spPr>
+      </p:pic>
+      <p:pic>
+        <p:nvPicPr>
+          <p:cNvPr id="6" name="Imagem 6" descr="Interface gráfica do usuário, Aplicativo, Word, Teams&#10;&#10;Descrição gerada automaticamente">
+            <a:extLst>
+              <a:ext uri="{FF2B5EF4-FFF2-40B4-BE49-F238E27FC236}">
+                <a16:creationId xmlns:a16="http://schemas.microsoft.com/office/drawing/2014/main" id="{B9F6297C-E642-0E14-5257-2AEFA9BB2BC2}"/>
+              </a:ext>
+            </a:extLst>
+          </p:cNvPr>
+          <p:cNvPicPr>
+            <a:picLocks noChangeAspect="1"/>
+          </p:cNvPicPr>
+          <p:nvPr/>
+        </p:nvPicPr>
+        <p:blipFill>
+          <a:blip r:embed="rId4"/>
+          <a:stretch>
+            <a:fillRect/>
+          </a:stretch>
+        </p:blipFill>
+        <p:spPr>
+          <a:xfrm>
+            <a:off x="3911238" y="4496277"/>
+            <a:ext cx="1845377" cy="1813083"/>
+          </a:xfrm>
+          <a:prstGeom prst="rect">
+            <a:avLst/>
+          </a:prstGeom>
+        </p:spPr>
+      </p:pic>
       <p:sp>
         <p:nvSpPr>
-          <p:cNvPr id="3" name="Espaço Reservado para Conteúdo 2">
+          <p:cNvPr id="22" name="Content Placeholder 21">
             <a:extLst>
               <a:ext uri="{FF2B5EF4-FFF2-40B4-BE49-F238E27FC236}">
-                <a16:creationId xmlns:a16="http://schemas.microsoft.com/office/drawing/2014/main" id="{64BA419B-8CAB-4B15-B0D8-E17B35CEB743}"/>
+                <a16:creationId xmlns:a16="http://schemas.microsoft.com/office/drawing/2014/main" id="{D6904D5B-1764-F44B-9B8F-63209A57734F}"/>
               </a:ext>
             </a:extLst>
           </p:cNvPr>
@@ -21604,51 +22575,37 @@
             <p:ph idx="1"/>
           </p:nvPr>
         </p:nvSpPr>
-        <p:spPr/>
+        <p:spPr>
+          <a:xfrm>
+            <a:off x="6252973" y="2286000"/>
+            <a:ext cx="4815077" cy="4023360"/>
+          </a:xfrm>
+        </p:spPr>
         <p:txBody>
-          <a:bodyPr/>
+          <a:bodyPr vert="horz" lIns="45720" tIns="45720" rIns="45720" bIns="45720" rtlCol="0" anchor="t">
+            <a:normAutofit/>
+          </a:bodyPr>
           <a:lstStyle/>
           <a:p>
+            <a:pPr marL="0" indent="0">
+              <a:buNone/>
+            </a:pPr>
             <a:r>
-              <a:rPr lang="pt-BR" dirty="0"/>
-              <a:t>Processo de Trabalho (Design </a:t>
+              <a:rPr lang="en-US" sz="2000"/>
+              <a:t>Essa </a:t>
             </a:r>
             <a:r>
-              <a:rPr lang="pt-BR" dirty="0" err="1"/>
-              <a:t>Thinking</a:t>
+              <a:rPr lang="pt-BR" sz="2000"/>
+              <a:t>área, será destinada para se colocar dicas e ou instruções, como mostrado nos exemplos ao lado, onde se tem corretoras, bancos e uma aba exclusiva ao banco central para que o usuário consiga maiores informações.</a:t>
             </a:r>
-            <a:r>
-              <a:rPr lang="pt-BR" dirty="0"/>
-              <a:t> e Scrum)</a:t>
-            </a:r>
-          </a:p>
-          <a:p>
-            <a:r>
-              <a:rPr lang="pt-BR" dirty="0"/>
-              <a:t>Divisão de Papéis</a:t>
-            </a:r>
-          </a:p>
-          <a:p>
-            <a:r>
-              <a:rPr lang="pt-BR" dirty="0"/>
-              <a:t>Ferramentas</a:t>
-            </a:r>
-          </a:p>
-          <a:p>
-            <a:r>
-              <a:rPr lang="pt-BR" dirty="0"/>
-              <a:t>Controle de Versão</a:t>
-            </a:r>
-          </a:p>
-          <a:p>
-            <a:endParaRPr lang="pt-BR" dirty="0"/>
+            <a:endParaRPr lang="en-US" sz="2000" err="1"/>
           </a:p>
         </p:txBody>
       </p:sp>
     </p:spTree>
     <p:extLst>
       <p:ext uri="{BB962C8B-B14F-4D97-AF65-F5344CB8AC3E}">
-        <p14:creationId xmlns:p14="http://schemas.microsoft.com/office/powerpoint/2010/main" val="2874110374"/>
+        <p14:creationId xmlns:p14="http://schemas.microsoft.com/office/powerpoint/2010/main" val="1284657838"/>
       </p:ext>
     </p:extLst>
   </p:cSld>
@@ -21661,6 +22618,14 @@
 <file path=ppt/slides/slide8.xml><?xml version="1.0" encoding="utf-8"?>
 <p:sld xmlns:a="http://schemas.openxmlformats.org/drawingml/2006/main" xmlns:r="http://schemas.openxmlformats.org/officeDocument/2006/relationships" xmlns:p="http://schemas.openxmlformats.org/presentationml/2006/main">
   <p:cSld>
+    <p:bg>
+      <p:bgPr>
+        <a:solidFill>
+          <a:schemeClr val="bg1"/>
+        </a:solidFill>
+        <a:effectLst/>
+      </p:bgPr>
+    </p:bg>
     <p:spTree>
       <p:nvGrpSpPr>
         <p:cNvPr id="1" name=""/>
@@ -21677,10 +22642,10 @@
       </p:grpSpPr>
       <p:sp>
         <p:nvSpPr>
-          <p:cNvPr id="4" name="Título 3">
+          <p:cNvPr id="2" name="Título 1">
             <a:extLst>
               <a:ext uri="{FF2B5EF4-FFF2-40B4-BE49-F238E27FC236}">
-                <a16:creationId xmlns:a16="http://schemas.microsoft.com/office/drawing/2014/main" id="{8BF5C42F-EF95-444A-82E0-0B2480293636}"/>
+                <a16:creationId xmlns:a16="http://schemas.microsoft.com/office/drawing/2014/main" id="{25CB8B2F-7971-69C2-8A71-72F47E6ACFDA}"/>
               </a:ext>
             </a:extLst>
           </p:cNvPr>
@@ -21691,24 +22656,206 @@
             <p:ph type="title"/>
           </p:nvPr>
         </p:nvSpPr>
-        <p:spPr/>
+        <p:spPr>
+          <a:xfrm>
+            <a:off x="5951728" y="585216"/>
+            <a:ext cx="5740739" cy="1499616"/>
+          </a:xfrm>
+        </p:spPr>
         <p:txBody>
-          <a:bodyPr/>
+          <a:bodyPr>
+            <a:normAutofit/>
+          </a:bodyPr>
           <a:lstStyle/>
           <a:p>
             <a:r>
-              <a:rPr lang="pt-BR" dirty="0"/>
-              <a:t>Projeto XPTO</a:t>
+              <a:rPr lang="pt-BR"/>
+              <a:t>dados</a:t>
             </a:r>
           </a:p>
         </p:txBody>
       </p:sp>
+      <p:pic>
+        <p:nvPicPr>
+          <p:cNvPr id="5" name="Imagem 5" descr="Interface gráfica do usuário&#10;&#10;Descrição gerada automaticamente">
+            <a:extLst>
+              <a:ext uri="{FF2B5EF4-FFF2-40B4-BE49-F238E27FC236}">
+                <a16:creationId xmlns:a16="http://schemas.microsoft.com/office/drawing/2014/main" id="{F2391007-2C40-B523-5DA4-97C719C10731}"/>
+              </a:ext>
+            </a:extLst>
+          </p:cNvPr>
+          <p:cNvPicPr>
+            <a:picLocks noChangeAspect="1"/>
+          </p:cNvPicPr>
+          <p:nvPr/>
+        </p:nvPicPr>
+        <p:blipFill rotWithShape="1">
+          <a:blip r:embed="rId2"/>
+          <a:srcRect l="7566" r="7563" b="-4"/>
+          <a:stretch/>
+        </p:blipFill>
+        <p:spPr>
+          <a:xfrm>
+            <a:off x="484635" y="484632"/>
+            <a:ext cx="3248521" cy="3511948"/>
+          </a:xfrm>
+          <a:prstGeom prst="rect">
+            <a:avLst/>
+          </a:prstGeom>
+        </p:spPr>
+      </p:pic>
       <p:sp>
         <p:nvSpPr>
-          <p:cNvPr id="6" name="Espaço Reservado para Texto 5">
+          <p:cNvPr id="35" name="Rectangle 26">
             <a:extLst>
               <a:ext uri="{FF2B5EF4-FFF2-40B4-BE49-F238E27FC236}">
-                <a16:creationId xmlns:a16="http://schemas.microsoft.com/office/drawing/2014/main" id="{FF277B38-6BF8-40CC-929C-430FF75E2516}"/>
+                <a16:creationId xmlns:a16="http://schemas.microsoft.com/office/drawing/2014/main" id="{50F78CF7-743D-4F97-AEAF-6D872AEF4A65}"/>
+              </a:ext>
+              <a:ext uri="{C183D7F6-B498-43B3-948B-1728B52AA6E4}">
+                <adec:decorative xmlns:adec="http://schemas.microsoft.com/office/drawing/2017/decorative" val="1"/>
+              </a:ext>
+            </a:extLst>
+          </p:cNvPr>
+          <p:cNvSpPr>
+            <a:spLocks noGrp="1" noRot="1" noChangeAspect="1" noMove="1" noResize="1" noEditPoints="1" noAdjustHandles="1" noChangeArrowheads="1" noChangeShapeType="1" noTextEdit="1"/>
+          </p:cNvSpPr>
+          <p:nvPr>
+            <p:extLst>
+              <p:ext uri="{386F3935-93C4-4BCD-93E2-E3B085C9AB24}">
+                <p16:designElem xmlns:p16="http://schemas.microsoft.com/office/powerpoint/2015/main" val="1"/>
+              </p:ext>
+            </p:extLst>
+          </p:nvPr>
+        </p:nvSpPr>
+        <p:spPr>
+          <a:xfrm>
+            <a:off x="3897745" y="484632"/>
+            <a:ext cx="1082693" cy="3511948"/>
+          </a:xfrm>
+          <a:prstGeom prst="rect">
+            <a:avLst/>
+          </a:prstGeom>
+          <a:solidFill>
+            <a:schemeClr val="accent1">
+              <a:alpha val="80000"/>
+            </a:schemeClr>
+          </a:solidFill>
+          <a:ln>
+            <a:noFill/>
+          </a:ln>
+        </p:spPr>
+        <p:style>
+          <a:lnRef idx="2">
+            <a:schemeClr val="accent1">
+              <a:shade val="50000"/>
+            </a:schemeClr>
+          </a:lnRef>
+          <a:fillRef idx="1">
+            <a:schemeClr val="accent1"/>
+          </a:fillRef>
+          <a:effectRef idx="0">
+            <a:schemeClr val="accent1"/>
+          </a:effectRef>
+          <a:fontRef idx="minor">
+            <a:schemeClr val="lt1"/>
+          </a:fontRef>
+        </p:style>
+        <p:txBody>
+          <a:bodyPr rtlCol="0" anchor="ctr"/>
+          <a:lstStyle/>
+          <a:p>
+            <a:pPr algn="ctr"/>
+            <a:endParaRPr lang="en-US"/>
+          </a:p>
+        </p:txBody>
+      </p:sp>
+      <p:cxnSp>
+        <p:nvCxnSpPr>
+          <p:cNvPr id="36" name="Straight Connector 28">
+            <a:extLst>
+              <a:ext uri="{FF2B5EF4-FFF2-40B4-BE49-F238E27FC236}">
+                <a16:creationId xmlns:a16="http://schemas.microsoft.com/office/drawing/2014/main" id="{A7DCBFCC-8C5F-4A93-997F-0A2BB3F0DF7F}"/>
+              </a:ext>
+              <a:ext uri="{C183D7F6-B498-43B3-948B-1728B52AA6E4}">
+                <adec:decorative xmlns:adec="http://schemas.microsoft.com/office/drawing/2017/decorative" val="1"/>
+              </a:ext>
+            </a:extLst>
+          </p:cNvPr>
+          <p:cNvCxnSpPr>
+            <a:cxnSpLocks noGrp="1" noRot="1" noChangeAspect="1" noMove="1" noResize="1" noEditPoints="1" noAdjustHandles="1" noChangeArrowheads="1" noChangeShapeType="1"/>
+          </p:cNvCxnSpPr>
+          <p:nvPr>
+            <p:extLst>
+              <p:ext uri="{386F3935-93C4-4BCD-93E2-E3B085C9AB24}">
+                <p16:designElem xmlns:p16="http://schemas.microsoft.com/office/powerpoint/2015/main" val="1"/>
+              </p:ext>
+            </p:extLst>
+          </p:nvPr>
+        </p:nvCxnSpPr>
+        <p:spPr>
+          <a:xfrm flipV="1">
+            <a:off x="5689600" y="826324"/>
+            <a:ext cx="0" cy="914400"/>
+          </a:xfrm>
+          <a:prstGeom prst="line">
+            <a:avLst/>
+          </a:prstGeom>
+          <a:ln w="19050">
+            <a:solidFill>
+              <a:schemeClr val="accent1"/>
+            </a:solidFill>
+          </a:ln>
+        </p:spPr>
+        <p:style>
+          <a:lnRef idx="1">
+            <a:schemeClr val="accent1"/>
+          </a:lnRef>
+          <a:fillRef idx="0">
+            <a:schemeClr val="accent1"/>
+          </a:fillRef>
+          <a:effectRef idx="0">
+            <a:schemeClr val="accent1"/>
+          </a:effectRef>
+          <a:fontRef idx="minor">
+            <a:schemeClr val="tx1"/>
+          </a:fontRef>
+        </p:style>
+      </p:cxnSp>
+      <p:pic>
+        <p:nvPicPr>
+          <p:cNvPr id="4" name="Imagem 4" descr="Interface gráfica do usuário&#10;&#10;Descrição gerada automaticamente">
+            <a:extLst>
+              <a:ext uri="{FF2B5EF4-FFF2-40B4-BE49-F238E27FC236}">
+                <a16:creationId xmlns:a16="http://schemas.microsoft.com/office/drawing/2014/main" id="{F4CED221-43C3-FB63-DCFB-682A084F2C9A}"/>
+              </a:ext>
+            </a:extLst>
+          </p:cNvPr>
+          <p:cNvPicPr>
+            <a:picLocks noChangeAspect="1"/>
+          </p:cNvPicPr>
+          <p:nvPr/>
+        </p:nvPicPr>
+        <p:blipFill rotWithShape="1">
+          <a:blip r:embed="rId3"/>
+          <a:srcRect r="4" b="46335"/>
+          <a:stretch/>
+        </p:blipFill>
+        <p:spPr>
+          <a:xfrm>
+            <a:off x="484633" y="4150596"/>
+            <a:ext cx="4495802" cy="2231808"/>
+          </a:xfrm>
+          <a:prstGeom prst="rect">
+            <a:avLst/>
+          </a:prstGeom>
+        </p:spPr>
+      </p:pic>
+      <p:sp>
+        <p:nvSpPr>
+          <p:cNvPr id="22" name="Content Placeholder 21">
+            <a:extLst>
+              <a:ext uri="{FF2B5EF4-FFF2-40B4-BE49-F238E27FC236}">
+                <a16:creationId xmlns:a16="http://schemas.microsoft.com/office/drawing/2014/main" id="{D6904D5B-1764-F44B-9B8F-63209A57734F}"/>
               </a:ext>
             </a:extLst>
           </p:cNvPr>
@@ -21716,105 +22863,183 @@
             <a:spLocks noGrp="1"/>
           </p:cNvSpPr>
           <p:nvPr>
-            <p:ph type="body" sz="half" idx="2"/>
+            <p:ph idx="1"/>
           </p:nvPr>
         </p:nvSpPr>
-        <p:spPr/>
+        <p:spPr>
+          <a:xfrm>
+            <a:off x="5951728" y="2286000"/>
+            <a:ext cx="5740739" cy="4023360"/>
+          </a:xfrm>
+        </p:spPr>
         <p:txBody>
-          <a:bodyPr/>
+          <a:bodyPr vert="horz" lIns="45720" tIns="45720" rIns="45720" bIns="45720" rtlCol="0" anchor="t">
+            <a:normAutofit/>
+          </a:bodyPr>
           <a:lstStyle/>
           <a:p>
-            <a:pPr lvl="0"/>
-            <a:r>
-              <a:rPr lang="pt-BR" sz="2400" b="1" dirty="0"/>
-              <a:t>Equipe</a:t>
-            </a:r>
-            <a:endParaRPr lang="pt-BR" b="1" dirty="0"/>
-          </a:p>
-          <a:p>
-            <a:pPr marL="285750" lvl="0" indent="-285750">
-              <a:buFont typeface="Arial" panose="020B0604020202020204" pitchFamily="34" charset="0"/>
-              <a:buChar char="•"/>
+            <a:pPr marL="0" indent="0">
+              <a:buNone/>
             </a:pPr>
             <a:r>
-              <a:rPr lang="pt-BR" dirty="0"/>
-              <a:t>Fulano</a:t>
+              <a:rPr lang="en-US"/>
+              <a:t>Essa </a:t>
+            </a:r>
+            <a:r>
+              <a:rPr lang="pt-BR"/>
+              <a:t>área, será destinada para que o usuário, possa colocar suas informações cadastrais e informações para o uso da aplicação de auxilio no controle de receita.</a:t>
             </a:r>
           </a:p>
+        </p:txBody>
+      </p:sp>
+    </p:spTree>
+    <p:extLst>
+      <p:ext uri="{BB962C8B-B14F-4D97-AF65-F5344CB8AC3E}">
+        <p14:creationId xmlns:p14="http://schemas.microsoft.com/office/powerpoint/2010/main" val="2051478103"/>
+      </p:ext>
+    </p:extLst>
+  </p:cSld>
+  <p:clrMapOvr>
+    <a:masterClrMapping/>
+  </p:clrMapOvr>
+</p:sld>
+</file>
+
+<file path=ppt/slides/slide9.xml><?xml version="1.0" encoding="utf-8"?>
+<p:sld xmlns:a="http://schemas.openxmlformats.org/drawingml/2006/main" xmlns:r="http://schemas.openxmlformats.org/officeDocument/2006/relationships" xmlns:p="http://schemas.openxmlformats.org/presentationml/2006/main">
+  <p:cSld>
+    <p:bg>
+      <p:bgPr>
+        <a:solidFill>
+          <a:schemeClr val="bg1"/>
+        </a:solidFill>
+        <a:effectLst/>
+      </p:bgPr>
+    </p:bg>
+    <p:spTree>
+      <p:nvGrpSpPr>
+        <p:cNvPr id="1" name=""/>
+        <p:cNvGrpSpPr/>
+        <p:nvPr/>
+      </p:nvGrpSpPr>
+      <p:grpSpPr>
+        <a:xfrm>
+          <a:off x="0" y="0"/>
+          <a:ext cx="0" cy="0"/>
+          <a:chOff x="0" y="0"/>
+          <a:chExt cx="0" cy="0"/>
+        </a:xfrm>
+      </p:grpSpPr>
+      <p:sp>
+        <p:nvSpPr>
+          <p:cNvPr id="2" name="Título 1">
+            <a:extLst>
+              <a:ext uri="{FF2B5EF4-FFF2-40B4-BE49-F238E27FC236}">
+                <a16:creationId xmlns:a16="http://schemas.microsoft.com/office/drawing/2014/main" id="{25CB8B2F-7971-69C2-8A71-72F47E6ACFDA}"/>
+              </a:ext>
+            </a:extLst>
+          </p:cNvPr>
+          <p:cNvSpPr>
+            <a:spLocks noGrp="1"/>
+          </p:cNvSpPr>
+          <p:nvPr>
+            <p:ph type="title"/>
+          </p:nvPr>
+        </p:nvSpPr>
+        <p:spPr>
+          <a:xfrm>
+            <a:off x="1024128" y="585216"/>
+            <a:ext cx="9720072" cy="1499616"/>
+          </a:xfrm>
+        </p:spPr>
+        <p:txBody>
+          <a:bodyPr>
+            <a:normAutofit/>
+          </a:bodyPr>
+          <a:lstStyle/>
           <a:p>
-            <a:pPr marL="285750" lvl="0" indent="-285750">
-              <a:buFont typeface="Arial" panose="020B0604020202020204" pitchFamily="34" charset="0"/>
-              <a:buChar char="•"/>
+            <a:r>
+              <a:rPr lang="pt-BR" err="1"/>
+              <a:t>academy</a:t>
+            </a:r>
+          </a:p>
+        </p:txBody>
+      </p:sp>
+      <p:sp>
+        <p:nvSpPr>
+          <p:cNvPr id="22" name="Content Placeholder 21">
+            <a:extLst>
+              <a:ext uri="{FF2B5EF4-FFF2-40B4-BE49-F238E27FC236}">
+                <a16:creationId xmlns:a16="http://schemas.microsoft.com/office/drawing/2014/main" id="{D6904D5B-1764-F44B-9B8F-63209A57734F}"/>
+              </a:ext>
+            </a:extLst>
+          </p:cNvPr>
+          <p:cNvSpPr>
+            <a:spLocks noGrp="1"/>
+          </p:cNvSpPr>
+          <p:nvPr>
+            <p:ph idx="1"/>
+          </p:nvPr>
+        </p:nvSpPr>
+        <p:spPr>
+          <a:xfrm>
+            <a:off x="1024128" y="2286000"/>
+            <a:ext cx="4754880" cy="4023360"/>
+          </a:xfrm>
+        </p:spPr>
+        <p:txBody>
+          <a:bodyPr vert="horz" lIns="45720" tIns="45720" rIns="45720" bIns="45720" rtlCol="0">
+            <a:normAutofit/>
+          </a:bodyPr>
+          <a:lstStyle/>
+          <a:p>
+            <a:pPr marL="0" indent="0">
+              <a:buNone/>
             </a:pPr>
             <a:r>
-              <a:rPr lang="pt-BR" dirty="0"/>
-              <a:t>Ciclano</a:t>
+              <a:rPr lang="en-US"/>
+              <a:t>Essa </a:t>
             </a:r>
-          </a:p>
-          <a:p>
-            <a:pPr marL="285750" lvl="0" indent="-285750">
-              <a:buFont typeface="Arial" panose="020B0604020202020204" pitchFamily="34" charset="0"/>
-              <a:buChar char="•"/>
-            </a:pPr>
             <a:r>
-              <a:rPr lang="pt-BR" dirty="0"/>
-              <a:t>Beltrano</a:t>
+              <a:rPr lang="pt-BR"/>
+              <a:t>área, será destinada para se colocar vídeos de criadores de conteúdo da área de finança, que irão ajudar a instruir o usuário, á como fazer o controle de gasto até como fazer o primeiro aporte na bolsa de valores. </a:t>
             </a:r>
-          </a:p>
-          <a:p>
-            <a:endParaRPr lang="pt-BR" dirty="0"/>
           </a:p>
         </p:txBody>
       </p:sp>
       <p:pic>
         <p:nvPicPr>
-          <p:cNvPr id="1026" name="Picture 2">
+          <p:cNvPr id="5" name="Imagem 5" descr="Interface gráfica do usuário, Site&#10;&#10;Descrição gerada automaticamente">
             <a:extLst>
               <a:ext uri="{FF2B5EF4-FFF2-40B4-BE49-F238E27FC236}">
-                <a16:creationId xmlns:a16="http://schemas.microsoft.com/office/drawing/2014/main" id="{7A6077C5-D874-4EB6-922B-F4E71AA55FFE}"/>
+                <a16:creationId xmlns:a16="http://schemas.microsoft.com/office/drawing/2014/main" id="{F2391007-2C40-B523-5DA4-97C719C10731}"/>
               </a:ext>
             </a:extLst>
           </p:cNvPr>
           <p:cNvPicPr>
-            <a:picLocks noGrp="1" noChangeAspect="1" noChangeArrowheads="1"/>
+            <a:picLocks noChangeAspect="1"/>
           </p:cNvPicPr>
-          <p:nvPr>
-            <p:ph type="pic" idx="1"/>
-          </p:nvPr>
+          <p:nvPr/>
         </p:nvPicPr>
-        <p:blipFill>
-          <a:blip r:embed="rId2">
-            <a:extLst>
-              <a:ext uri="{28A0092B-C50C-407E-A947-70E740481C1C}">
-                <a14:useLocalDpi xmlns:a14="http://schemas.microsoft.com/office/drawing/2010/main" val="0"/>
-              </a:ext>
-            </a:extLst>
-          </a:blip>
-          <a:srcRect t="14276" b="14276"/>
-          <a:stretch>
-            <a:fillRect/>
-          </a:stretch>
+        <p:blipFill rotWithShape="1">
+          <a:blip r:embed="rId2"/>
+          <a:srcRect r="3" b="3121"/>
+          <a:stretch/>
         </p:blipFill>
-        <p:spPr bwMode="auto">
+        <p:spPr>
+          <a:xfrm>
+            <a:off x="6217922" y="2087672"/>
+            <a:ext cx="4766360" cy="4221688"/>
+          </a:xfrm>
           <a:prstGeom prst="rect">
             <a:avLst/>
           </a:prstGeom>
-          <a:noFill/>
-          <a:extLst>
-            <a:ext uri="{909E8E84-426E-40DD-AFC4-6F175D3DCCD1}">
-              <a14:hiddenFill xmlns:a14="http://schemas.microsoft.com/office/drawing/2010/main">
-                <a:solidFill>
-                  <a:srgbClr val="FFFFFF"/>
-                </a:solidFill>
-              </a14:hiddenFill>
-            </a:ext>
-          </a:extLst>
         </p:spPr>
       </p:pic>
     </p:spTree>
     <p:extLst>
       <p:ext uri="{BB962C8B-B14F-4D97-AF65-F5344CB8AC3E}">
-        <p14:creationId xmlns:p14="http://schemas.microsoft.com/office/powerpoint/2010/main" val="3379578871"/>
+        <p14:creationId xmlns:p14="http://schemas.microsoft.com/office/powerpoint/2010/main" val="1823419791"/>
       </p:ext>
     </p:extLst>
   </p:cSld>

</xml_diff>